<commit_message>
update Introduction to GraphQl Calculator.pptx
</commit_message>
<xml_diff>
--- a/static/Introduction to GraphQl Calculator.pptx
+++ b/static/Introduction to GraphQl Calculator.pptx
@@ -2805,7 +2805,19 @@
                 <a:ea typeface="Microsoft YaHei" panose="020B0503020204020204" pitchFamily="34" charset="-122"/>
                 <a:sym typeface="+mn-ea"/>
               </a:rPr>
-              <a:t>项目地址：https://github.com/graphql-calculator/graphql-calculator</a:t>
+              <a:t>项目地址：</a:t>
+            </a:r>
+            <a:r>
+              <a:rPr lang="zh-CN" altLang="en-US" dirty="0">
+                <a:solidFill>
+                  <a:schemeClr val="tx1"/>
+                </a:solidFill>
+                <a:latin typeface="Microsoft YaHei" panose="020B0503020204020204" pitchFamily="34" charset="-122"/>
+                <a:ea typeface="Microsoft YaHei" panose="020B0503020204020204" pitchFamily="34" charset="-122"/>
+                <a:sym typeface="+mn-ea"/>
+                <a:hlinkClick r:id="rId1" tooltip="" action="ppaction://hlinkfile"/>
+              </a:rPr>
+              <a:t>https://github.com/graphql-calculator/graphql-calculator</a:t>
             </a:r>
             <a:endParaRPr lang="zh-CN" altLang="en-US" dirty="0">
               <a:solidFill>
@@ -2921,7 +2933,7 @@
           <p:nvPr/>
         </p:nvPicPr>
         <p:blipFill>
-          <a:blip r:embed="rId1"/>
+          <a:blip r:embed="rId2"/>
           <a:stretch>
             <a:fillRect/>
           </a:stretch>
@@ -3229,7 +3241,7 @@
           <p:nvPr/>
         </p:nvPicPr>
         <p:blipFill>
-          <a:blip r:embed="rId2"/>
+          <a:blip r:embed="rId3"/>
           <a:stretch>
             <a:fillRect/>
           </a:stretch>
@@ -4240,8 +4252,19 @@
                 </a:solidFill>
                 <a:latin typeface="Microsoft YaHei" panose="020B0503020204020204" pitchFamily="34" charset="-122"/>
                 <a:ea typeface="Microsoft YaHei" panose="020B0503020204020204" pitchFamily="34" charset="-122"/>
-              </a:rPr>
-              <a:t>数据依赖编排能力不足导致</a:t>
+                <a:sym typeface="+mn-ea"/>
+              </a:rPr>
+              <a:t>没有编排依赖</a:t>
+            </a:r>
+            <a:r>
+              <a:rPr lang="zh-CN" altLang="en-US" dirty="0">
+                <a:solidFill>
+                  <a:schemeClr val="tx1"/>
+                </a:solidFill>
+                <a:latin typeface="Microsoft YaHei" panose="020B0503020204020204" pitchFamily="34" charset="-122"/>
+                <a:ea typeface="Microsoft YaHei" panose="020B0503020204020204" pitchFamily="34" charset="-122"/>
+              </a:rPr>
+              <a:t>数据能力使得</a:t>
             </a:r>
             <a:r>
               <a:rPr lang="en-US" altLang="zh-CN" dirty="0">
@@ -4271,7 +4294,17 @@
                 <a:latin typeface="Microsoft YaHei" panose="020B0503020204020204" pitchFamily="34" charset="-122"/>
                 <a:ea typeface="Microsoft YaHei" panose="020B0503020204020204" pitchFamily="34" charset="-122"/>
               </a:rPr>
-              <a:t>，继而导致性能问题</a:t>
+              <a:t>，继而导致</a:t>
+            </a:r>
+            <a:r>
+              <a:rPr lang="zh-CN" altLang="en-US" b="1" dirty="0">
+                <a:solidFill>
+                  <a:srgbClr val="FF0000"/>
+                </a:solidFill>
+                <a:latin typeface="Microsoft YaHei" panose="020B0503020204020204" pitchFamily="34" charset="-122"/>
+                <a:ea typeface="Microsoft YaHei" panose="020B0503020204020204" pitchFamily="34" charset="-122"/>
+              </a:rPr>
+              <a:t>性能问题</a:t>
             </a:r>
             <a:r>
               <a:rPr lang="zh-CN" altLang="en-US" b="1" dirty="0">
@@ -4312,7 +4345,27 @@
                 <a:latin typeface="Microsoft YaHei" panose="020B0503020204020204" pitchFamily="34" charset="-122"/>
                 <a:ea typeface="Microsoft YaHei" panose="020B0503020204020204" pitchFamily="34" charset="-122"/>
               </a:rPr>
-              <a:t>计算能力不足导致原生查询不能满足业务快速开发，逻辑稍有变化就需要编码上线。</a:t>
+              <a:t>计算能力不足导致原生查询不能满足业务快速开发，逻辑稍有变化就需要编码部署、</a:t>
+            </a:r>
+            <a:r>
+              <a:rPr lang="zh-CN" altLang="en-US" b="1" dirty="0">
+                <a:solidFill>
+                  <a:srgbClr val="FF0000"/>
+                </a:solidFill>
+                <a:latin typeface="Microsoft YaHei" panose="020B0503020204020204" pitchFamily="34" charset="-122"/>
+                <a:ea typeface="Microsoft YaHei" panose="020B0503020204020204" pitchFamily="34" charset="-122"/>
+              </a:rPr>
+              <a:t>迭代成本大</a:t>
+            </a:r>
+            <a:r>
+              <a:rPr lang="zh-CN" altLang="en-US" dirty="0">
+                <a:solidFill>
+                  <a:schemeClr val="tx1"/>
+                </a:solidFill>
+                <a:latin typeface="Microsoft YaHei" panose="020B0503020204020204" pitchFamily="34" charset="-122"/>
+                <a:ea typeface="Microsoft YaHei" panose="020B0503020204020204" pitchFamily="34" charset="-122"/>
+              </a:rPr>
+              <a:t>。</a:t>
             </a:r>
             <a:endParaRPr lang="zh-CN" altLang="en-US" dirty="0">
               <a:solidFill>
@@ -4449,7 +4502,7 @@
         <p:spPr>
           <a:xfrm>
             <a:off x="732790" y="1457325"/>
-            <a:ext cx="5328285" cy="2413635"/>
+            <a:ext cx="5328285" cy="3511550"/>
           </a:xfrm>
           <a:prstGeom prst="rect">
             <a:avLst/>
@@ -4463,6 +4516,56 @@
             <a:spAutoFit/>
           </a:bodyPr>
           <a:p>
+            <a:pPr marL="0" indent="0" eaLnBrk="1" fontAlgn="auto" latinLnBrk="0" hangingPunct="1">
+              <a:lnSpc>
+                <a:spcPct val="150000"/>
+              </a:lnSpc>
+              <a:spcBef>
+                <a:spcPts val="1000"/>
+              </a:spcBef>
+              <a:buSzPct val="100000"/>
+              <a:buFont typeface="Arial" panose="020B0604020202090204" pitchFamily="34" charset="0"/>
+              <a:buNone/>
+              <a:defRPr sz="1400"/>
+            </a:pPr>
+            <a:r>
+              <a:rPr lang="en-US" altLang="zh-CN" b="1" dirty="0">
+                <a:solidFill>
+                  <a:schemeClr val="tx1">
+                    <a:lumMod val="75000"/>
+                    <a:lumOff val="25000"/>
+                  </a:schemeClr>
+                </a:solidFill>
+                <a:latin typeface="Microsoft YaHei" panose="020B0503020204020204" pitchFamily="34" charset="-122"/>
+                <a:ea typeface="Microsoft YaHei" panose="020B0503020204020204" pitchFamily="34" charset="-122"/>
+              </a:rPr>
+              <a:t>GraphQl Calculator</a:t>
+            </a:r>
+            <a:r>
+              <a:rPr lang="zh-CN" altLang="en-US" b="1" dirty="0">
+                <a:solidFill>
+                  <a:schemeClr val="tx1">
+                    <a:lumMod val="75000"/>
+                    <a:lumOff val="25000"/>
+                  </a:schemeClr>
+                </a:solidFill>
+                <a:latin typeface="Microsoft YaHei" panose="020B0503020204020204" pitchFamily="34" charset="-122"/>
+                <a:ea typeface="Microsoft YaHei" panose="020B0503020204020204" pitchFamily="34" charset="-122"/>
+              </a:rPr>
+              <a:t>是一款基于指令实现的轻量级查询计算引擎，允许用户使用指令和表达式对查询数据进行加工转换和编排控制，该组件具有以下特点：</a:t>
+            </a:r>
+            <a:endParaRPr lang="zh-CN" altLang="en-US" b="1" dirty="0">
+              <a:solidFill>
+                <a:schemeClr val="tx1">
+                  <a:lumMod val="75000"/>
+                  <a:lumOff val="25000"/>
+                </a:schemeClr>
+              </a:solidFill>
+              <a:latin typeface="Microsoft YaHei" panose="020B0503020204020204" pitchFamily="34" charset="-122"/>
+              <a:ea typeface="Microsoft YaHei" panose="020B0503020204020204" pitchFamily="34" charset="-122"/>
+            </a:endParaRPr>
+          </a:p>
+          <a:p>
             <a:pPr marL="342900" indent="-342900" eaLnBrk="1" fontAlgn="auto" latinLnBrk="0" hangingPunct="1">
               <a:lnSpc>
                 <a:spcPct val="150000"/>
@@ -4651,7 +4754,7 @@
                 <a:latin typeface="Microsoft YaHei" panose="020B0503020204020204" pitchFamily="34" charset="-122"/>
                 <a:ea typeface="Microsoft YaHei" panose="020B0503020204020204" pitchFamily="34" charset="-122"/>
               </a:rPr>
-              <a:t>：数据基本加工转换、控制流和数据编排；</a:t>
+              <a:t>：能力包括数据基本加工转换、控制流和数据编排等；</a:t>
             </a:r>
             <a:endParaRPr lang="zh-CN" altLang="en-US" dirty="0">
               <a:solidFill>
@@ -4798,7 +4901,7 @@
         </p:nvSpPr>
         <p:spPr>
           <a:xfrm>
-            <a:off x="732790" y="4022090"/>
+            <a:off x="732790" y="5155565"/>
             <a:ext cx="5328285" cy="412750"/>
           </a:xfrm>
           <a:prstGeom prst="rect">
@@ -5617,9 +5720,9 @@
             </a:lvl9pPr>
           </a:lstStyle>
           <a:p>
-            <a:pPr marL="0" indent="0">
-              <a:lnSpc>
-                <a:spcPct val="200000"/>
+            <a:pPr marL="0" indent="0" fontAlgn="auto" latinLnBrk="0">
+              <a:lnSpc>
+                <a:spcPct val="150000"/>
               </a:lnSpc>
               <a:buFont typeface="Arial" panose="020B0604020202090204" pitchFamily="34" charset="0"/>
               <a:buNone/>
@@ -5667,9 +5770,9 @@
             </a:endParaRPr>
           </a:p>
           <a:p>
-            <a:pPr marL="0" indent="0">
-              <a:lnSpc>
-                <a:spcPct val="200000"/>
+            <a:pPr marL="0" indent="0" fontAlgn="auto" latinLnBrk="0">
+              <a:lnSpc>
+                <a:spcPct val="150000"/>
               </a:lnSpc>
               <a:buFont typeface="Arial" panose="020B0604020202090204" pitchFamily="34" charset="0"/>
               <a:buNone/>
@@ -6001,7 +6104,7 @@
                 <a:ea typeface="Microsoft YaHei" panose="020B0503020204020204" pitchFamily="34" charset="-122"/>
                 <a:sym typeface="+mn-ea"/>
               </a:rPr>
-              <a:t>bindingItems</a:t>
+              <a:t>bindingItemIds</a:t>
             </a:r>
             <a:r>
               <a:rPr lang="zh-CN" altLang="en-US" dirty="0">
@@ -6023,7 +6126,7 @@
                 <a:ea typeface="Microsoft YaHei" panose="020B0503020204020204" pitchFamily="34" charset="-122"/>
                 <a:sym typeface="+mn-ea"/>
               </a:rPr>
-              <a:t>bindingItems</a:t>
+              <a:t>bindingItemIds</a:t>
             </a:r>
             <a:r>
               <a:rPr lang="zh-CN" altLang="en-US" dirty="0">
@@ -6166,7 +6269,7 @@
                 </a:solidFill>
                 <a:sym typeface="+mn-ea"/>
               </a:rPr>
-              <a:t>而</a:t>
+              <a:t>二</a:t>
             </a:r>
             <a:r>
               <a:rPr lang="en-US" altLang="zh-CN" dirty="0">
@@ -6311,7 +6414,7 @@
         <p:spPr>
           <a:xfrm>
             <a:off x="653415" y="946150"/>
-            <a:ext cx="4890770" cy="367030"/>
+            <a:ext cx="5347970" cy="367030"/>
           </a:xfrm>
           <a:prstGeom prst="rect">
             <a:avLst/>
@@ -6352,7 +6455,7 @@
                 <a:ea typeface="微软雅黑" panose="020B0503020204020204" pitchFamily="34" charset="-122"/>
                 <a:sym typeface="+mn-ea"/>
               </a:rPr>
-              <a:t>案例：分别获取指定商品和商品列表的货主信息</a:t>
+              <a:t>案例：分别获取指定商品信息和商品列表的货主信息</a:t>
             </a:r>
             <a:endParaRPr kumimoji="1" lang="zh-CN" altLang="en-US" sz="1800" dirty="0">
               <a:solidFill>
@@ -6550,7 +6653,40 @@
                 <a:ea typeface="Microsoft YaHei" panose="020B0503020204020204" pitchFamily="34" charset="-122"/>
                 <a:sym typeface="+mn-ea"/>
               </a:rPr>
-              <a:t>更复杂的例子：先从商品中获取商品的货主</a:t>
+              <a:t>更复杂的例子：</a:t>
+            </a:r>
+            <a:r>
+              <a:rPr kumimoji="1" lang="zh-CN" altLang="en-US" dirty="0">
+                <a:solidFill>
+                  <a:srgbClr val="FF0000"/>
+                </a:solidFill>
+                <a:latin typeface="微软雅黑" panose="020B0503020204020204" pitchFamily="34" charset="-122"/>
+                <a:ea typeface="微软雅黑" panose="020B0503020204020204" pitchFamily="34" charset="-122"/>
+                <a:sym typeface="+mn-ea"/>
+              </a:rPr>
+              <a:t>通过商品</a:t>
+            </a:r>
+            <a:r>
+              <a:rPr kumimoji="1" lang="en-US" altLang="zh-CN" dirty="0">
+                <a:solidFill>
+                  <a:srgbClr val="FF0000"/>
+                </a:solidFill>
+                <a:latin typeface="微软雅黑" panose="020B0503020204020204" pitchFamily="34" charset="-122"/>
+                <a:ea typeface="微软雅黑" panose="020B0503020204020204" pitchFamily="34" charset="-122"/>
+                <a:sym typeface="+mn-ea"/>
+              </a:rPr>
+              <a:t>id</a:t>
+            </a:r>
+            <a:r>
+              <a:rPr lang="zh-CN" altLang="en-US" dirty="0">
+                <a:solidFill>
+                  <a:schemeClr val="tx1"/>
+                </a:solidFill>
+                <a:latin typeface="Microsoft YaHei" panose="020B0503020204020204" pitchFamily="34" charset="-122"/>
+                <a:ea typeface="Microsoft YaHei" panose="020B0503020204020204" pitchFamily="34" charset="-122"/>
+                <a:sym typeface="+mn-ea"/>
+              </a:rPr>
+              <a:t>先从商品中获取商品基本信息、包括商品的货主</a:t>
             </a:r>
             <a:r>
               <a:rPr lang="en-US" altLang="zh-CN" dirty="0">
@@ -7673,7 +7809,7 @@
         <p:spPr>
           <a:xfrm>
             <a:off x="772795" y="1564640"/>
-            <a:ext cx="9269095" cy="2196465"/>
+            <a:ext cx="9304655" cy="2196465"/>
           </a:xfrm>
           <a:prstGeom prst="rect">
             <a:avLst/>
@@ -7847,7 +7983,7 @@
                 <a:ea typeface="Microsoft YaHei" panose="020B0503020204020204" pitchFamily="34" charset="-122"/>
                 <a:sym typeface="+mn-ea"/>
               </a:rPr>
-              <a:t>命名参考</a:t>
+              <a:t>指令命名参考</a:t>
             </a:r>
             <a:r>
               <a:rPr lang="en-US" altLang="zh-CN" dirty="0">
@@ -8096,7 +8232,7 @@
                 <a:ea typeface="Microsoft YaHei" panose="020B0503020204020204" pitchFamily="34" charset="-122"/>
                 <a:sym typeface="+mn-ea"/>
               </a:rPr>
-              <a:t>：对列表类型字段进行过滤、排序和去重，排序依据是解析完成的</a:t>
+              <a:t>：对列表类型字段进行过滤、排序和去重，排序依据数据是解析完成的</a:t>
             </a:r>
             <a:r>
               <a:rPr lang="en-US" altLang="zh-CN" dirty="0">
@@ -9884,7 +10020,7 @@
                 <a:ea typeface="Microsoft YaHei" panose="020B0503020204020204" pitchFamily="34" charset="-122"/>
                 <a:sym typeface="+mn-ea"/>
               </a:rPr>
-              <a:t>：完善的集成测试和实际的业务场景落地验证；</a:t>
+              <a:t>：完善的集成测试和实际的业务场景落地验证，保证了该组件的可用性；</a:t>
             </a:r>
             <a:endParaRPr lang="zh-CN" altLang="en-US" dirty="0">
               <a:solidFill>
@@ -10173,7 +10309,33 @@
                 <a:latin typeface="Microsoft YaHei" panose="020B0503020204020204" pitchFamily="34" charset="-122"/>
                 <a:ea typeface="Microsoft YaHei" panose="020B0503020204020204" pitchFamily="34" charset="-122"/>
               </a:rPr>
-              <a:t>类似于mysql中的join，将[ItemInfo] 和[SellerInfo] 按照货主id进行匹配后、合并成List在页面进行展示是常见的业务处理逻辑。使用 @Map 和 @fetchSource进行处理会使得其中一个类型每个需要被合并的字段都需要单独进行处理，字段较多或者匹配逻辑复杂时会是的查询dsl的可读性变差。</a:t>
+              <a:t>类似于mysql中的join，将[ItemInfo] 和[SellerInfo] 按照货主id进行匹配后、合并成List在页面进行展示是常见的业务处理逻辑。使用 @Map 和 @fetchSource进行处理会使得其中一个类型每个需要被合并的字段都需要单独进行处理，字段较多或者匹配逻辑复杂时会</a:t>
+            </a:r>
+            <a:r>
+              <a:rPr lang="zh-CN" dirty="0">
+                <a:solidFill>
+                  <a:schemeClr val="tx1">
+                    <a:lumMod val="75000"/>
+                    <a:lumOff val="25000"/>
+                  </a:schemeClr>
+                </a:solidFill>
+                <a:latin typeface="Microsoft YaHei" panose="020B0503020204020204" pitchFamily="34" charset="-122"/>
+                <a:ea typeface="Microsoft YaHei" panose="020B0503020204020204" pitchFamily="34" charset="-122"/>
+              </a:rPr>
+              <a:t>使得</a:t>
+            </a:r>
+            <a:r>
+              <a:rPr dirty="0">
+                <a:solidFill>
+                  <a:schemeClr val="tx1">
+                    <a:lumMod val="75000"/>
+                    <a:lumOff val="25000"/>
+                  </a:schemeClr>
+                </a:solidFill>
+                <a:latin typeface="Microsoft YaHei" panose="020B0503020204020204" pitchFamily="34" charset="-122"/>
+                <a:ea typeface="Microsoft YaHei" panose="020B0503020204020204" pitchFamily="34" charset="-122"/>
+              </a:rPr>
+              <a:t>查询dsl的可读性变差。</a:t>
             </a:r>
             <a:endParaRPr dirty="0">
               <a:solidFill>

</xml_diff>